<commit_message>
Reorder pictures, add text to results and experiments
</commit_message>
<xml_diff>
--- a/report/02-presentation/presentation.pptx
+++ b/report/02-presentation/presentation.pptx
@@ -3965,7 +3965,52 @@
           <a:bodyPr/>
           <a:lstStyle/>
           <a:p>
-            <a:endParaRPr lang="en-US"/>
+            <a:pPr marL="0" indent="0">
+              <a:buNone/>
+            </a:pPr>
+            <a:r>
+              <a:rPr lang="en-US" dirty="0" smtClean="0"/>
+              <a:t>Distortion of results by junk drives through:</a:t>
+            </a:r>
+            <a:endParaRPr lang="en-US" dirty="0"/>
+          </a:p>
+          <a:p>
+            <a:r>
+              <a:rPr lang="en-US" dirty="0" smtClean="0"/>
+              <a:t>Influencing the model</a:t>
+            </a:r>
+          </a:p>
+          <a:p>
+            <a:r>
+              <a:rPr lang="en-US" dirty="0" smtClean="0"/>
+              <a:t>Distorting the probabilities</a:t>
+            </a:r>
+          </a:p>
+          <a:p>
+            <a:endParaRPr lang="en-US" dirty="0"/>
+          </a:p>
+          <a:p>
+            <a:pPr>
+              <a:buFont typeface="Wingdings" charset="2"/>
+              <a:buChar char="Ø"/>
+            </a:pPr>
+            <a:r>
+              <a:rPr lang="en-US" dirty="0" smtClean="0"/>
+              <a:t>Direct </a:t>
+            </a:r>
+            <a:r>
+              <a:rPr lang="en-US" dirty="0" err="1" smtClean="0"/>
+              <a:t>influency</a:t>
+            </a:r>
+            <a:r>
+              <a:rPr lang="en-US" dirty="0" smtClean="0"/>
+              <a:t> on FPR and TPR -</a:t>
+            </a:r>
+            <a:r>
+              <a:rPr lang="en-US" smtClean="0"/>
+              <a:t>&gt; AUC</a:t>
+            </a:r>
+            <a:endParaRPr lang="en-US" dirty="0" smtClean="0"/>
           </a:p>
         </p:txBody>
       </p:sp>
@@ -4172,7 +4217,7 @@
         </p:blipFill>
         <p:spPr>
           <a:xfrm>
-            <a:off x="609630" y="1520305"/>
+            <a:off x="466755" y="1456805"/>
             <a:ext cx="5096934" cy="4131734"/>
           </a:xfrm>
           <a:prstGeom prst="rect">
@@ -4215,7 +4260,7 @@
         </p:nvSpPr>
         <p:spPr>
           <a:xfrm>
-            <a:off x="5638796" y="3115746"/>
+            <a:off x="5749921" y="2194996"/>
             <a:ext cx="3217333" cy="2350030"/>
           </a:xfrm>
         </p:spPr>
@@ -4236,13 +4281,15 @@
       <p:cxnSp>
         <p:nvCxnSpPr>
           <p:cNvPr id="6" name="Straight Arrow Connector 5"/>
-          <p:cNvCxnSpPr/>
+          <p:cNvCxnSpPr>
+            <a:stCxn id="3" idx="1"/>
+          </p:cNvCxnSpPr>
           <p:nvPr/>
         </p:nvCxnSpPr>
         <p:spPr>
           <a:xfrm flipH="1">
-            <a:off x="4114798" y="3759200"/>
-            <a:ext cx="1405466" cy="118533"/>
+            <a:off x="3968750" y="3370011"/>
+            <a:ext cx="1781171" cy="455864"/>
           </a:xfrm>
           <a:prstGeom prst="straightConnector1">
             <a:avLst/>
@@ -4272,13 +4319,15 @@
       <p:cxnSp>
         <p:nvCxnSpPr>
           <p:cNvPr id="9" name="Straight Arrow Connector 8"/>
-          <p:cNvCxnSpPr/>
+          <p:cNvCxnSpPr>
+            <a:stCxn id="3" idx="1"/>
+          </p:cNvCxnSpPr>
           <p:nvPr/>
         </p:nvCxnSpPr>
         <p:spPr>
           <a:xfrm flipH="1" flipV="1">
-            <a:off x="3081868" y="2980268"/>
-            <a:ext cx="2438396" cy="778932"/>
+            <a:off x="3081868" y="3000375"/>
+            <a:ext cx="2668053" cy="369636"/>
           </a:xfrm>
           <a:prstGeom prst="straightConnector1">
             <a:avLst/>
@@ -4458,8 +4507,8 @@
         </p:blipFill>
         <p:spPr>
           <a:xfrm>
-            <a:off x="3358311" y="3081854"/>
-            <a:ext cx="4735834" cy="3708400"/>
+            <a:off x="4524375" y="3322486"/>
+            <a:ext cx="3982520" cy="3118517"/>
           </a:xfrm>
           <a:prstGeom prst="rect">
             <a:avLst/>
@@ -4501,8 +4550,8 @@
         </p:nvSpPr>
         <p:spPr>
           <a:xfrm>
-            <a:off x="457200" y="2023525"/>
-            <a:ext cx="8229600" cy="1396999"/>
+            <a:off x="158750" y="2023525"/>
+            <a:ext cx="8528050" cy="1396999"/>
           </a:xfrm>
         </p:spPr>
         <p:txBody>
@@ -4597,6 +4646,48 @@
           </a:p>
           <a:p>
             <a:endParaRPr lang="en-US" sz="1100" dirty="0"/>
+          </a:p>
+        </p:txBody>
+      </p:sp>
+      <p:sp>
+        <p:nvSpPr>
+          <p:cNvPr id="7" name="TextBox 6"/>
+          <p:cNvSpPr txBox="1"/>
+          <p:nvPr/>
+        </p:nvSpPr>
+        <p:spPr>
+          <a:xfrm>
+            <a:off x="492125" y="4000500"/>
+            <a:ext cx="3937000" cy="1631216"/>
+          </a:xfrm>
+          <a:prstGeom prst="rect">
+            <a:avLst/>
+          </a:prstGeom>
+          <a:noFill/>
+        </p:spPr>
+        <p:txBody>
+          <a:bodyPr wrap="square" rtlCol="0">
+            <a:spAutoFit/>
+          </a:bodyPr>
+          <a:lstStyle/>
+          <a:p>
+            <a:r>
+              <a:rPr lang="en-US" sz="2000" b="1" dirty="0" smtClean="0"/>
+              <a:t>Fundamental assumption:</a:t>
+            </a:r>
+          </a:p>
+          <a:p>
+            <a:pPr marL="342900" indent="-342900">
+              <a:buFont typeface="Arial"/>
+              <a:buChar char="•"/>
+            </a:pPr>
+            <a:r>
+              <a:rPr lang="en-US" sz="2000" dirty="0" smtClean="0"/>
+              <a:t>Amount of normal data points exceeds the amount of anomalous data points by far</a:t>
+            </a:r>
+          </a:p>
+          <a:p>
+            <a:endParaRPr lang="en-US" sz="2000" b="1" dirty="0"/>
           </a:p>
         </p:txBody>
       </p:sp>
@@ -4740,6 +4831,59 @@
                       </p:childTnLst>
                     </p:cTn>
                   </p:par>
+                  <p:par>
+                    <p:cTn id="11" fill="hold">
+                      <p:stCondLst>
+                        <p:cond delay="indefinite"/>
+                      </p:stCondLst>
+                      <p:childTnLst>
+                        <p:par>
+                          <p:cTn id="12" fill="hold">
+                            <p:stCondLst>
+                              <p:cond delay="0"/>
+                            </p:stCondLst>
+                            <p:childTnLst>
+                              <p:par>
+                                <p:cTn id="13" presetID="16" presetClass="entr" presetSubtype="21" fill="hold" grpId="0" nodeType="clickEffect">
+                                  <p:stCondLst>
+                                    <p:cond delay="0"/>
+                                  </p:stCondLst>
+                                  <p:childTnLst>
+                                    <p:set>
+                                      <p:cBhvr>
+                                        <p:cTn id="14" dur="1" fill="hold">
+                                          <p:stCondLst>
+                                            <p:cond delay="0"/>
+                                          </p:stCondLst>
+                                        </p:cTn>
+                                        <p:tgtEl>
+                                          <p:spTgt spid="7"/>
+                                        </p:tgtEl>
+                                        <p:attrNameLst>
+                                          <p:attrName>style.visibility</p:attrName>
+                                        </p:attrNameLst>
+                                      </p:cBhvr>
+                                      <p:to>
+                                        <p:strVal val="visible"/>
+                                      </p:to>
+                                    </p:set>
+                                    <p:animEffect transition="in" filter="barn(inVertical)">
+                                      <p:cBhvr>
+                                        <p:cTn id="15" dur="500"/>
+                                        <p:tgtEl>
+                                          <p:spTgt spid="7"/>
+                                        </p:tgtEl>
+                                      </p:cBhvr>
+                                    </p:animEffect>
+                                  </p:childTnLst>
+                                </p:cTn>
+                              </p:par>
+                            </p:childTnLst>
+                          </p:cTn>
+                        </p:par>
+                      </p:childTnLst>
+                    </p:cTn>
+                  </p:par>
                 </p:childTnLst>
               </p:cTn>
               <p:prevCondLst>
@@ -4761,6 +4905,9 @@
         </p:cTn>
       </p:par>
     </p:tnLst>
+    <p:bldLst>
+      <p:bldP spid="7" grpId="0"/>
+    </p:bldLst>
   </p:timing>
 </p:sld>
 </file>
@@ -5406,14 +5553,16 @@
         </p:nvSpPr>
         <p:spPr/>
         <p:txBody>
-          <a:bodyPr/>
+          <a:bodyPr>
+            <a:normAutofit/>
+          </a:bodyPr>
           <a:lstStyle/>
           <a:p>
             <a:r>
-              <a:rPr lang="en-US" dirty="0" smtClean="0"/>
-              <a:t>Deep Learning Auto Encoder</a:t>
-            </a:r>
-            <a:endParaRPr lang="en-US" dirty="0"/>
+              <a:rPr lang="en-US" sz="3600" dirty="0" smtClean="0"/>
+              <a:t>Foundations: Deep Learning Auto Encoder</a:t>
+            </a:r>
+            <a:endParaRPr lang="en-US" sz="3600" dirty="0"/>
           </a:p>
         </p:txBody>
       </p:sp>
@@ -5546,7 +5695,7 @@
           <a:graphicData uri="http://schemas.openxmlformats.org/presentationml/2006/ole">
             <mc:AlternateContent xmlns:mc="http://schemas.openxmlformats.org/markup-compatibility/2006">
               <mc:Choice xmlns:v="urn:schemas-microsoft-com:vml" Requires="v">
-                <p:oleObj spid="_x0000_s2059" name="Equation" r:id="rId4" imgW="1625600" imgH="1130300" progId="Equation.3">
+                <p:oleObj spid="_x0000_s2077" name="Equation" r:id="rId4" imgW="1625600" imgH="1130300" progId="Equation.3">
                   <p:embed/>
                 </p:oleObj>
               </mc:Choice>
@@ -5675,7 +5824,7 @@
           <a:graphicData uri="http://schemas.openxmlformats.org/presentationml/2006/ole">
             <mc:AlternateContent xmlns:mc="http://schemas.openxmlformats.org/markup-compatibility/2006">
               <mc:Choice xmlns:v="urn:schemas-microsoft-com:vml" Requires="v">
-                <p:oleObj spid="_x0000_s2060" name="Equation" r:id="rId6" imgW="2336800" imgH="1130300" progId="Equation.3">
+                <p:oleObj spid="_x0000_s2078" name="Equation" r:id="rId6" imgW="2336800" imgH="1130300" progId="Equation.3">
                   <p:embed/>
                 </p:oleObj>
               </mc:Choice>
@@ -5738,13 +5887,8 @@
             </a:pPr>
             <a:r>
               <a:rPr lang="en-US" sz="2400" dirty="0" smtClean="0"/>
-              <a:t>Most common used for dimensionality </a:t>
-            </a:r>
-            <a:r>
-              <a:rPr lang="en-US" sz="2400" smtClean="0"/>
-              <a:t>reduction purposes</a:t>
-            </a:r>
-            <a:endParaRPr lang="en-US" sz="2400" dirty="0" smtClean="0"/>
+              <a:t>Most commonly used for dimensionality reduction purposes</a:t>
+            </a:r>
           </a:p>
           <a:p>
             <a:endParaRPr lang="en-US" sz="2400" dirty="0"/>
@@ -5849,7 +5993,7 @@
           <a:graphicData uri="http://schemas.openxmlformats.org/presentationml/2006/ole">
             <mc:AlternateContent xmlns:mc="http://schemas.openxmlformats.org/markup-compatibility/2006">
               <mc:Choice xmlns:v="urn:schemas-microsoft-com:vml" Requires="v">
-                <p:oleObj spid="_x0000_s2061" name="Equation" r:id="rId8" imgW="266700" imgH="203200" progId="Equation.3">
+                <p:oleObj spid="_x0000_s2079" name="Equation" r:id="rId8" imgW="266700" imgH="203200" progId="Equation.3">
                   <p:embed/>
                 </p:oleObj>
               </mc:Choice>
@@ -5928,7 +6072,7 @@
                                           </p:stCondLst>
                                         </p:cTn>
                                         <p:tgtEl>
-                                          <p:spTgt spid="12"/>
+                                          <p:spTgt spid="9"/>
                                         </p:tgtEl>
                                         <p:attrNameLst>
                                           <p:attrName>style.visibility</p:attrName>
@@ -5942,7 +6086,7 @@
                                       <p:cBhvr additive="base">
                                         <p:cTn id="7" dur="500"/>
                                         <p:tgtEl>
-                                          <p:spTgt spid="12"/>
+                                          <p:spTgt spid="9"/>
                                         </p:tgtEl>
                                         <p:attrNameLst>
                                           <p:attrName>ppt_y</p:attrName>
@@ -5965,7 +6109,7 @@
                                       <p:cBhvr>
                                         <p:cTn id="8" dur="500"/>
                                         <p:tgtEl>
-                                          <p:spTgt spid="12"/>
+                                          <p:spTgt spid="9"/>
                                         </p:tgtEl>
                                       </p:cBhvr>
                                     </p:animEffect>
@@ -6030,15 +6174,167 @@
                                   </p:childTnLst>
                                 </p:cTn>
                               </p:par>
+                            </p:childTnLst>
+                          </p:cTn>
+                        </p:par>
+                      </p:childTnLst>
+                    </p:cTn>
+                  </p:par>
+                  <p:par>
+                    <p:cTn id="13" fill="hold">
+                      <p:stCondLst>
+                        <p:cond delay="indefinite"/>
+                      </p:stCondLst>
+                      <p:childTnLst>
+                        <p:par>
+                          <p:cTn id="14" fill="hold">
+                            <p:stCondLst>
+                              <p:cond delay="0"/>
+                            </p:stCondLst>
+                            <p:childTnLst>
                               <p:par>
-                                <p:cTn id="13" presetID="12" presetClass="entr" presetSubtype="4" fill="hold" nodeType="withEffect">
+                                <p:cTn id="15" presetID="12" presetClass="entr" presetSubtype="4" fill="hold" nodeType="clickEffect">
                                   <p:stCondLst>
                                     <p:cond delay="0"/>
                                   </p:stCondLst>
                                   <p:childTnLst>
                                     <p:set>
                                       <p:cBhvr>
-                                        <p:cTn id="14" dur="1" fill="hold">
+                                        <p:cTn id="16" dur="1" fill="hold">
+                                          <p:stCondLst>
+                                            <p:cond delay="0"/>
+                                          </p:stCondLst>
+                                        </p:cTn>
+                                        <p:tgtEl>
+                                          <p:spTgt spid="12"/>
+                                        </p:tgtEl>
+                                        <p:attrNameLst>
+                                          <p:attrName>style.visibility</p:attrName>
+                                        </p:attrNameLst>
+                                      </p:cBhvr>
+                                      <p:to>
+                                        <p:strVal val="visible"/>
+                                      </p:to>
+                                    </p:set>
+                                    <p:anim calcmode="lin" valueType="num">
+                                      <p:cBhvr additive="base">
+                                        <p:cTn id="17" dur="500"/>
+                                        <p:tgtEl>
+                                          <p:spTgt spid="12"/>
+                                        </p:tgtEl>
+                                        <p:attrNameLst>
+                                          <p:attrName>ppt_y</p:attrName>
+                                        </p:attrNameLst>
+                                      </p:cBhvr>
+                                      <p:tavLst>
+                                        <p:tav tm="0">
+                                          <p:val>
+                                            <p:strVal val="#ppt_y+#ppt_h*1.125000"/>
+                                          </p:val>
+                                        </p:tav>
+                                        <p:tav tm="100000">
+                                          <p:val>
+                                            <p:strVal val="#ppt_y"/>
+                                          </p:val>
+                                        </p:tav>
+                                      </p:tavLst>
+                                    </p:anim>
+                                    <p:animEffect transition="in" filter="wipe(up)">
+                                      <p:cBhvr>
+                                        <p:cTn id="18" dur="500"/>
+                                        <p:tgtEl>
+                                          <p:spTgt spid="12"/>
+                                        </p:tgtEl>
+                                      </p:cBhvr>
+                                    </p:animEffect>
+                                  </p:childTnLst>
+                                </p:cTn>
+                              </p:par>
+                              <p:par>
+                                <p:cTn id="19" presetID="12" presetClass="entr" presetSubtype="4" fill="hold" nodeType="withEffect">
+                                  <p:stCondLst>
+                                    <p:cond delay="0"/>
+                                  </p:stCondLst>
+                                  <p:childTnLst>
+                                    <p:set>
+                                      <p:cBhvr>
+                                        <p:cTn id="20" dur="1" fill="hold">
+                                          <p:stCondLst>
+                                            <p:cond delay="0"/>
+                                          </p:stCondLst>
+                                        </p:cTn>
+                                        <p:tgtEl>
+                                          <p:spTgt spid="13"/>
+                                        </p:tgtEl>
+                                        <p:attrNameLst>
+                                          <p:attrName>style.visibility</p:attrName>
+                                        </p:attrNameLst>
+                                      </p:cBhvr>
+                                      <p:to>
+                                        <p:strVal val="visible"/>
+                                      </p:to>
+                                    </p:set>
+                                    <p:anim calcmode="lin" valueType="num">
+                                      <p:cBhvr additive="base">
+                                        <p:cTn id="21" dur="500"/>
+                                        <p:tgtEl>
+                                          <p:spTgt spid="13"/>
+                                        </p:tgtEl>
+                                        <p:attrNameLst>
+                                          <p:attrName>ppt_y</p:attrName>
+                                        </p:attrNameLst>
+                                      </p:cBhvr>
+                                      <p:tavLst>
+                                        <p:tav tm="0">
+                                          <p:val>
+                                            <p:strVal val="#ppt_y+#ppt_h*1.125000"/>
+                                          </p:val>
+                                        </p:tav>
+                                        <p:tav tm="100000">
+                                          <p:val>
+                                            <p:strVal val="#ppt_y"/>
+                                          </p:val>
+                                        </p:tav>
+                                      </p:tavLst>
+                                    </p:anim>
+                                    <p:animEffect transition="in" filter="wipe(up)">
+                                      <p:cBhvr>
+                                        <p:cTn id="22" dur="500"/>
+                                        <p:tgtEl>
+                                          <p:spTgt spid="13"/>
+                                        </p:tgtEl>
+                                      </p:cBhvr>
+                                    </p:animEffect>
+                                  </p:childTnLst>
+                                </p:cTn>
+                              </p:par>
+                            </p:childTnLst>
+                          </p:cTn>
+                        </p:par>
+                      </p:childTnLst>
+                    </p:cTn>
+                  </p:par>
+                  <p:par>
+                    <p:cTn id="23" fill="hold">
+                      <p:stCondLst>
+                        <p:cond delay="indefinite"/>
+                      </p:stCondLst>
+                      <p:childTnLst>
+                        <p:par>
+                          <p:cTn id="24" fill="hold">
+                            <p:stCondLst>
+                              <p:cond delay="0"/>
+                            </p:stCondLst>
+                            <p:childTnLst>
+                              <p:par>
+                                <p:cTn id="25" presetID="12" presetClass="entr" presetSubtype="4" fill="hold" nodeType="clickEffect">
+                                  <p:stCondLst>
+                                    <p:cond delay="0"/>
+                                  </p:stCondLst>
+                                  <p:childTnLst>
+                                    <p:set>
+                                      <p:cBhvr>
+                                        <p:cTn id="26" dur="1" fill="hold">
                                           <p:stCondLst>
                                             <p:cond delay="0"/>
                                           </p:stCondLst>
@@ -6056,7 +6352,7 @@
                                     </p:set>
                                     <p:anim calcmode="lin" valueType="num">
                                       <p:cBhvr additive="base">
-                                        <p:cTn id="15" dur="500"/>
+                                        <p:cTn id="27" dur="500"/>
                                         <p:tgtEl>
                                           <p:spTgt spid="17"/>
                                         </p:tgtEl>
@@ -6079,7 +6375,7 @@
                                     </p:anim>
                                     <p:animEffect transition="in" filter="wipe(up)">
                                       <p:cBhvr>
-                                        <p:cTn id="16" dur="500"/>
+                                        <p:cTn id="28" dur="500"/>
                                         <p:tgtEl>
                                           <p:spTgt spid="17"/>
                                         </p:tgtEl>
@@ -6089,14 +6385,14 @@
                                 </p:cTn>
                               </p:par>
                               <p:par>
-                                <p:cTn id="17" presetID="12" presetClass="entr" presetSubtype="4" fill="hold" nodeType="withEffect">
+                                <p:cTn id="29" presetID="12" presetClass="entr" presetSubtype="4" fill="hold" nodeType="withEffect">
                                   <p:stCondLst>
                                     <p:cond delay="0"/>
                                   </p:stCondLst>
                                   <p:childTnLst>
                                     <p:set>
                                       <p:cBhvr>
-                                        <p:cTn id="18" dur="1" fill="hold">
+                                        <p:cTn id="30" dur="1" fill="hold">
                                           <p:stCondLst>
                                             <p:cond delay="0"/>
                                           </p:stCondLst>
@@ -6114,7 +6410,7 @@
                                     </p:set>
                                     <p:anim calcmode="lin" valueType="num">
                                       <p:cBhvr additive="base">
-                                        <p:cTn id="19" dur="500"/>
+                                        <p:cTn id="31" dur="500"/>
                                         <p:tgtEl>
                                           <p:spTgt spid="29"/>
                                         </p:tgtEl>
@@ -6137,7 +6433,7 @@
                                     </p:anim>
                                     <p:animEffect transition="in" filter="wipe(up)">
                                       <p:cBhvr>
-                                        <p:cTn id="20" dur="500"/>
+                                        <p:cTn id="32" dur="500"/>
                                         <p:tgtEl>
                                           <p:spTgt spid="29"/>
                                         </p:tgtEl>
@@ -6147,14 +6443,14 @@
                                 </p:cTn>
                               </p:par>
                               <p:par>
-                                <p:cTn id="21" presetID="12" presetClass="entr" presetSubtype="4" fill="hold" nodeType="withEffect">
+                                <p:cTn id="33" presetID="12" presetClass="entr" presetSubtype="4" fill="hold" nodeType="withEffect">
                                   <p:stCondLst>
                                     <p:cond delay="0"/>
                                   </p:stCondLst>
                                   <p:childTnLst>
                                     <p:set>
                                       <p:cBhvr>
-                                        <p:cTn id="22" dur="1" fill="hold">
+                                        <p:cTn id="34" dur="1" fill="hold">
                                           <p:stCondLst>
                                             <p:cond delay="0"/>
                                           </p:stCondLst>
@@ -6172,7 +6468,7 @@
                                     </p:set>
                                     <p:anim calcmode="lin" valueType="num">
                                       <p:cBhvr additive="base">
-                                        <p:cTn id="23" dur="500"/>
+                                        <p:cTn id="35" dur="500"/>
                                         <p:tgtEl>
                                           <p:spTgt spid="20"/>
                                         </p:tgtEl>
@@ -6195,7 +6491,7 @@
                                     </p:anim>
                                     <p:animEffect transition="in" filter="wipe(up)">
                                       <p:cBhvr>
-                                        <p:cTn id="24" dur="500"/>
+                                        <p:cTn id="36" dur="500"/>
                                         <p:tgtEl>
                                           <p:spTgt spid="20"/>
                                         </p:tgtEl>
@@ -6275,22 +6571,937 @@
           </a:p>
         </p:txBody>
       </p:sp>
-      <p:sp>
-        <p:nvSpPr>
-          <p:cNvPr id="3" name="Content Placeholder 2"/>
-          <p:cNvSpPr>
-            <a:spLocks noGrp="1"/>
-          </p:cNvSpPr>
-          <p:nvPr>
-            <p:ph idx="1"/>
-          </p:nvPr>
-        </p:nvSpPr>
-        <p:spPr/>
-        <p:txBody>
-          <a:bodyPr/>
+      <p:pic>
+        <p:nvPicPr>
+          <p:cNvPr id="4" name="Picture 3" descr="h2o-logo.jpg"/>
+          <p:cNvPicPr>
+            <a:picLocks noChangeAspect="1"/>
+          </p:cNvPicPr>
+          <p:nvPr/>
+        </p:nvPicPr>
+        <p:blipFill>
+          <a:blip r:embed="rId3">
+            <a:extLst>
+              <a:ext uri="{28A0092B-C50C-407E-A947-70E740481C1C}">
+                <a14:useLocalDpi xmlns:a14="http://schemas.microsoft.com/office/drawing/2010/main" val="0"/>
+              </a:ext>
+            </a:extLst>
+          </a:blip>
+          <a:stretch>
+            <a:fillRect/>
+          </a:stretch>
+        </p:blipFill>
+        <p:spPr>
+          <a:xfrm>
+            <a:off x="7048499" y="1380431"/>
+            <a:ext cx="1090491" cy="1090491"/>
+          </a:xfrm>
+          <a:prstGeom prst="rect">
+            <a:avLst/>
+          </a:prstGeom>
+        </p:spPr>
+      </p:pic>
+      <p:grpSp>
+        <p:nvGrpSpPr>
+          <p:cNvPr id="32" name="Group 31"/>
+          <p:cNvGrpSpPr/>
+          <p:nvPr/>
+        </p:nvGrpSpPr>
+        <p:grpSpPr>
+          <a:xfrm>
+            <a:off x="117649" y="2346325"/>
+            <a:ext cx="3152601" cy="3529048"/>
+            <a:chOff x="117649" y="2346325"/>
+            <a:chExt cx="3152601" cy="3529048"/>
+          </a:xfrm>
+        </p:grpSpPr>
+        <p:pic>
+          <p:nvPicPr>
+            <p:cNvPr id="21" name="Picture 20" descr="axa-trip.png"/>
+            <p:cNvPicPr>
+              <a:picLocks noChangeAspect="1"/>
+            </p:cNvPicPr>
+            <p:nvPr/>
+          </p:nvPicPr>
+          <p:blipFill>
+            <a:blip r:embed="rId4">
+              <a:extLst>
+                <a:ext uri="{28A0092B-C50C-407E-A947-70E740481C1C}">
+                  <a14:useLocalDpi xmlns:a14="http://schemas.microsoft.com/office/drawing/2010/main" val="0"/>
+                </a:ext>
+              </a:extLst>
+            </a:blip>
+            <a:stretch>
+              <a:fillRect/>
+            </a:stretch>
+          </p:blipFill>
+          <p:spPr>
+            <a:xfrm>
+              <a:off x="117649" y="2856309"/>
+              <a:ext cx="3152601" cy="2955564"/>
+            </a:xfrm>
+            <a:prstGeom prst="rect">
+              <a:avLst/>
+            </a:prstGeom>
+          </p:spPr>
+        </p:pic>
+        <p:pic>
+          <p:nvPicPr>
+            <p:cNvPr id="20" name="Picture 19" descr="axa-logo.png"/>
+            <p:cNvPicPr>
+              <a:picLocks noChangeAspect="1"/>
+            </p:cNvPicPr>
+            <p:nvPr/>
+          </p:nvPicPr>
+          <p:blipFill>
+            <a:blip r:embed="rId5">
+              <a:extLst>
+                <a:ext uri="{28A0092B-C50C-407E-A947-70E740481C1C}">
+                  <a14:useLocalDpi xmlns:a14="http://schemas.microsoft.com/office/drawing/2010/main" val="0"/>
+                </a:ext>
+              </a:extLst>
+            </a:blip>
+            <a:stretch>
+              <a:fillRect/>
+            </a:stretch>
+          </p:blipFill>
+          <p:spPr>
+            <a:xfrm>
+              <a:off x="1160636" y="2346325"/>
+              <a:ext cx="873125" cy="873125"/>
+            </a:xfrm>
+            <a:prstGeom prst="rect">
+              <a:avLst/>
+            </a:prstGeom>
+          </p:spPr>
+        </p:pic>
+        <p:sp>
+          <p:nvSpPr>
+            <p:cNvPr id="22" name="TextBox 21"/>
+            <p:cNvSpPr txBox="1"/>
+            <p:nvPr/>
+          </p:nvSpPr>
+          <p:spPr>
+            <a:xfrm>
+              <a:off x="451024" y="5506041"/>
+              <a:ext cx="2136601" cy="369332"/>
+            </a:xfrm>
+            <a:prstGeom prst="rect">
+              <a:avLst/>
+            </a:prstGeom>
+            <a:noFill/>
+          </p:spPr>
+          <p:txBody>
+            <a:bodyPr wrap="square" rtlCol="0">
+              <a:spAutoFit/>
+            </a:bodyPr>
+            <a:lstStyle/>
+            <a:p>
+              <a:pPr algn="ctr"/>
+              <a:r>
+                <a:rPr lang="en-US" dirty="0" smtClean="0">
+                  <a:latin typeface="Times"/>
+                  <a:cs typeface="Times"/>
+                </a:rPr>
+                <a:t>Dataset</a:t>
+              </a:r>
+              <a:endParaRPr lang="en-US" dirty="0">
+                <a:latin typeface="Times"/>
+                <a:cs typeface="Times"/>
+              </a:endParaRPr>
+            </a:p>
+          </p:txBody>
+        </p:sp>
+      </p:grpSp>
+      <p:grpSp>
+        <p:nvGrpSpPr>
+          <p:cNvPr id="34" name="Group 33"/>
+          <p:cNvGrpSpPr/>
+          <p:nvPr/>
+        </p:nvGrpSpPr>
+        <p:grpSpPr>
+          <a:xfrm>
+            <a:off x="4064000" y="1396306"/>
+            <a:ext cx="1619250" cy="2032694"/>
+            <a:chOff x="4175125" y="1396306"/>
+            <a:chExt cx="1619250" cy="2032694"/>
+          </a:xfrm>
+        </p:grpSpPr>
+        <p:pic>
+          <p:nvPicPr>
+            <p:cNvPr id="5" name="Picture 4" descr="flink-logo.png"/>
+            <p:cNvPicPr>
+              <a:picLocks noChangeAspect="1"/>
+            </p:cNvPicPr>
+            <p:nvPr/>
+          </p:nvPicPr>
+          <p:blipFill>
+            <a:blip r:embed="rId6">
+              <a:extLst>
+                <a:ext uri="{28A0092B-C50C-407E-A947-70E740481C1C}">
+                  <a14:useLocalDpi xmlns:a14="http://schemas.microsoft.com/office/drawing/2010/main" val="0"/>
+                </a:ext>
+              </a:extLst>
+            </a:blip>
+            <a:stretch>
+              <a:fillRect/>
+            </a:stretch>
+          </p:blipFill>
+          <p:spPr>
+            <a:xfrm>
+              <a:off x="4601307" y="1647825"/>
+              <a:ext cx="693615" cy="693615"/>
+            </a:xfrm>
+            <a:prstGeom prst="rect">
+              <a:avLst/>
+            </a:prstGeom>
+          </p:spPr>
+        </p:pic>
+        <p:sp>
+          <p:nvSpPr>
+            <p:cNvPr id="27" name="Rectangle 26"/>
+            <p:cNvSpPr/>
+            <p:nvPr/>
+          </p:nvSpPr>
+          <p:spPr>
+            <a:xfrm>
+              <a:off x="4385935" y="2416785"/>
+              <a:ext cx="1265080" cy="775427"/>
+            </a:xfrm>
+            <a:prstGeom prst="rect">
+              <a:avLst/>
+            </a:prstGeom>
+            <a:solidFill>
+              <a:srgbClr val="FFFFFF"/>
+            </a:solidFill>
+            <a:ln>
+              <a:solidFill>
+                <a:srgbClr val="A6A6A6"/>
+              </a:solidFill>
+            </a:ln>
+          </p:spPr>
+          <p:style>
+            <a:lnRef idx="1">
+              <a:schemeClr val="accent1"/>
+            </a:lnRef>
+            <a:fillRef idx="3">
+              <a:schemeClr val="accent1"/>
+            </a:fillRef>
+            <a:effectRef idx="2">
+              <a:schemeClr val="accent1"/>
+            </a:effectRef>
+            <a:fontRef idx="minor">
+              <a:schemeClr val="lt1"/>
+            </a:fontRef>
+          </p:style>
+          <p:txBody>
+            <a:bodyPr rtlCol="0" anchor="ctr"/>
+            <a:lstStyle/>
+            <a:p>
+              <a:pPr algn="ctr"/>
+              <a:endParaRPr lang="en-US"/>
+            </a:p>
+          </p:txBody>
+        </p:sp>
+        <p:sp>
+          <p:nvSpPr>
+            <p:cNvPr id="28" name="TextBox 27"/>
+            <p:cNvSpPr txBox="1"/>
+            <p:nvPr/>
+          </p:nvSpPr>
+          <p:spPr>
+            <a:xfrm>
+              <a:off x="4358519" y="2500450"/>
+              <a:ext cx="1319911" cy="646331"/>
+            </a:xfrm>
+            <a:prstGeom prst="rect">
+              <a:avLst/>
+            </a:prstGeom>
+            <a:noFill/>
+          </p:spPr>
+          <p:txBody>
+            <a:bodyPr wrap="square" rtlCol="0">
+              <a:spAutoFit/>
+            </a:bodyPr>
+            <a:lstStyle/>
+            <a:p>
+              <a:pPr algn="ctr"/>
+              <a:r>
+                <a:rPr lang="en-US" dirty="0" smtClean="0">
+                  <a:latin typeface="Times"/>
+                  <a:cs typeface="Times"/>
+                </a:rPr>
+                <a:t>Feature Extractor</a:t>
+              </a:r>
+              <a:endParaRPr lang="en-US" dirty="0">
+                <a:latin typeface="Times"/>
+                <a:cs typeface="Times"/>
+              </a:endParaRPr>
+            </a:p>
+          </p:txBody>
+        </p:sp>
+        <p:sp>
+          <p:nvSpPr>
+            <p:cNvPr id="29" name="Rectangle 28"/>
+            <p:cNvSpPr/>
+            <p:nvPr/>
+          </p:nvSpPr>
+          <p:spPr>
+            <a:xfrm>
+              <a:off x="4175125" y="1396306"/>
+              <a:ext cx="1619250" cy="2032694"/>
+            </a:xfrm>
+            <a:prstGeom prst="rect">
+              <a:avLst/>
+            </a:prstGeom>
+            <a:noFill/>
+            <a:ln>
+              <a:solidFill>
+                <a:schemeClr val="tx1"/>
+              </a:solidFill>
+            </a:ln>
+          </p:spPr>
+          <p:style>
+            <a:lnRef idx="1">
+              <a:schemeClr val="accent1"/>
+            </a:lnRef>
+            <a:fillRef idx="3">
+              <a:schemeClr val="accent1"/>
+            </a:fillRef>
+            <a:effectRef idx="2">
+              <a:schemeClr val="accent1"/>
+            </a:effectRef>
+            <a:fontRef idx="minor">
+              <a:schemeClr val="lt1"/>
+            </a:fontRef>
+          </p:style>
+          <p:txBody>
+            <a:bodyPr rtlCol="0" anchor="ctr"/>
+            <a:lstStyle/>
+            <a:p>
+              <a:pPr algn="ctr"/>
+              <a:endParaRPr lang="en-US"/>
+            </a:p>
+          </p:txBody>
+        </p:sp>
+      </p:grpSp>
+      <p:grpSp>
+        <p:nvGrpSpPr>
+          <p:cNvPr id="42" name="Group 41"/>
+          <p:cNvGrpSpPr/>
+          <p:nvPr/>
+        </p:nvGrpSpPr>
+        <p:grpSpPr>
+          <a:xfrm>
+            <a:off x="2921000" y="2692453"/>
+            <a:ext cx="841375" cy="863547"/>
+            <a:chOff x="2921000" y="2692453"/>
+            <a:chExt cx="841375" cy="863547"/>
+          </a:xfrm>
+        </p:grpSpPr>
+        <p:cxnSp>
+          <p:nvCxnSpPr>
+            <p:cNvPr id="25" name="Straight Arrow Connector 24"/>
+            <p:cNvCxnSpPr/>
+            <p:nvPr/>
+          </p:nvCxnSpPr>
+          <p:spPr>
+            <a:xfrm flipV="1">
+              <a:off x="2921000" y="2692453"/>
+              <a:ext cx="841375" cy="863547"/>
+            </a:xfrm>
+            <a:prstGeom prst="straightConnector1">
+              <a:avLst/>
+            </a:prstGeom>
+            <a:ln>
+              <a:solidFill>
+                <a:schemeClr val="bg1">
+                  <a:lumMod val="50000"/>
+                </a:schemeClr>
+              </a:solidFill>
+              <a:tailEnd type="arrow"/>
+            </a:ln>
+          </p:spPr>
+          <p:style>
+            <a:lnRef idx="2">
+              <a:schemeClr val="accent1"/>
+            </a:lnRef>
+            <a:fillRef idx="0">
+              <a:schemeClr val="accent1"/>
+            </a:fillRef>
+            <a:effectRef idx="1">
+              <a:schemeClr val="accent1"/>
+            </a:effectRef>
+            <a:fontRef idx="minor">
+              <a:schemeClr val="tx1"/>
+            </a:fontRef>
+          </p:style>
+        </p:cxnSp>
+        <p:sp>
+          <p:nvSpPr>
+            <p:cNvPr id="39" name="TextBox 38"/>
+            <p:cNvSpPr txBox="1"/>
+            <p:nvPr/>
+          </p:nvSpPr>
+          <p:spPr>
+            <a:xfrm>
+              <a:off x="3048000" y="2692453"/>
+              <a:ext cx="349250" cy="369332"/>
+            </a:xfrm>
+            <a:prstGeom prst="rect">
+              <a:avLst/>
+            </a:prstGeom>
+            <a:noFill/>
+          </p:spPr>
+          <p:txBody>
+            <a:bodyPr wrap="square" rtlCol="0">
+              <a:spAutoFit/>
+            </a:bodyPr>
+            <a:lstStyle/>
+            <a:p>
+              <a:r>
+                <a:rPr lang="en-US" b="1" dirty="0" smtClean="0"/>
+                <a:t>1</a:t>
+              </a:r>
+              <a:endParaRPr lang="en-US" b="1" dirty="0"/>
+            </a:p>
+          </p:txBody>
+        </p:sp>
+      </p:grpSp>
+      <p:grpSp>
+        <p:nvGrpSpPr>
+          <p:cNvPr id="43" name="Group 42"/>
+          <p:cNvGrpSpPr/>
+          <p:nvPr/>
+        </p:nvGrpSpPr>
+        <p:grpSpPr>
+          <a:xfrm>
+            <a:off x="5915025" y="3146781"/>
+            <a:ext cx="625475" cy="1708827"/>
+            <a:chOff x="4188557" y="2368906"/>
+            <a:chExt cx="625475" cy="1708827"/>
+          </a:xfrm>
+        </p:grpSpPr>
+        <p:cxnSp>
+          <p:nvCxnSpPr>
+            <p:cNvPr id="36" name="Straight Arrow Connector 35"/>
+            <p:cNvCxnSpPr/>
+            <p:nvPr/>
+          </p:nvCxnSpPr>
+          <p:spPr>
+            <a:xfrm flipV="1">
+              <a:off x="4188557" y="2368906"/>
+              <a:ext cx="593725" cy="1708827"/>
+            </a:xfrm>
+            <a:prstGeom prst="straightConnector1">
+              <a:avLst/>
+            </a:prstGeom>
+            <a:ln>
+              <a:solidFill>
+                <a:schemeClr val="bg1">
+                  <a:lumMod val="50000"/>
+                </a:schemeClr>
+              </a:solidFill>
+              <a:tailEnd type="arrow"/>
+            </a:ln>
+          </p:spPr>
+          <p:style>
+            <a:lnRef idx="2">
+              <a:schemeClr val="accent1"/>
+            </a:lnRef>
+            <a:fillRef idx="0">
+              <a:schemeClr val="accent1"/>
+            </a:fillRef>
+            <a:effectRef idx="1">
+              <a:schemeClr val="accent1"/>
+            </a:effectRef>
+            <a:fontRef idx="minor">
+              <a:schemeClr val="tx1"/>
+            </a:fontRef>
+          </p:style>
+        </p:cxnSp>
+        <p:sp>
+          <p:nvSpPr>
+            <p:cNvPr id="41" name="TextBox 40"/>
+            <p:cNvSpPr txBox="1"/>
+            <p:nvPr/>
+          </p:nvSpPr>
+          <p:spPr>
+            <a:xfrm>
+              <a:off x="4464782" y="3185527"/>
+              <a:ext cx="349250" cy="369332"/>
+            </a:xfrm>
+            <a:prstGeom prst="rect">
+              <a:avLst/>
+            </a:prstGeom>
+            <a:noFill/>
+          </p:spPr>
+          <p:txBody>
+            <a:bodyPr wrap="square" rtlCol="0">
+              <a:spAutoFit/>
+            </a:bodyPr>
+            <a:lstStyle/>
+            <a:p>
+              <a:r>
+                <a:rPr lang="en-US" b="1" dirty="0" smtClean="0"/>
+                <a:t>3</a:t>
+              </a:r>
+              <a:endParaRPr lang="en-US" b="1" dirty="0"/>
+            </a:p>
+          </p:txBody>
+        </p:sp>
+      </p:grpSp>
+      <p:grpSp>
+        <p:nvGrpSpPr>
+          <p:cNvPr id="60" name="Group 59"/>
+          <p:cNvGrpSpPr/>
+          <p:nvPr/>
+        </p:nvGrpSpPr>
+        <p:grpSpPr>
+          <a:xfrm>
+            <a:off x="4046767" y="3833258"/>
+            <a:ext cx="1685465" cy="2501835"/>
+            <a:chOff x="4046767" y="3833258"/>
+            <a:chExt cx="1685465" cy="2501835"/>
+          </a:xfrm>
+        </p:grpSpPr>
+        <p:graphicFrame>
+          <p:nvGraphicFramePr>
+            <p:cNvPr id="35" name="Object 34"/>
+            <p:cNvGraphicFramePr>
+              <a:graphicFrameLocks noChangeAspect="1"/>
+            </p:cNvGraphicFramePr>
+            <p:nvPr>
+              <p:extLst>
+                <p:ext uri="{D42A27DB-BD31-4B8C-83A1-F6EECF244321}">
+                  <p14:modId xmlns:p14="http://schemas.microsoft.com/office/powerpoint/2010/main" val="699722091"/>
+                </p:ext>
+              </p:extLst>
+            </p:nvPr>
+          </p:nvGraphicFramePr>
+          <p:xfrm>
+            <a:off x="4127500" y="4702508"/>
+            <a:ext cx="1573281" cy="1109365"/>
+          </p:xfrm>
+          <a:graphic>
+            <a:graphicData uri="http://schemas.openxmlformats.org/presentationml/2006/ole">
+              <mc:AlternateContent xmlns:mc="http://schemas.openxmlformats.org/markup-compatibility/2006">
+                <mc:Choice xmlns:v="urn:schemas-microsoft-com:vml" Requires="v">
+                  <p:oleObj spid="_x0000_s3076" name="Equation" r:id="rId7" imgW="1981200" imgH="1397000" progId="Equation.3">
+                    <p:embed/>
+                  </p:oleObj>
+                </mc:Choice>
+                <mc:Fallback>
+                  <p:oleObj name="Equation" r:id="rId7" imgW="1981200" imgH="1397000" progId="Equation.3">
+                    <p:embed/>
+                    <p:pic>
+                      <p:nvPicPr>
+                        <p:cNvPr id="0" name=""/>
+                        <p:cNvPicPr/>
+                        <p:nvPr/>
+                      </p:nvPicPr>
+                      <p:blipFill>
+                        <a:blip r:embed="rId8"/>
+                        <a:stretch>
+                          <a:fillRect/>
+                        </a:stretch>
+                      </p:blipFill>
+                      <p:spPr>
+                        <a:xfrm>
+                          <a:off x="4127500" y="4702508"/>
+                          <a:ext cx="1573281" cy="1109365"/>
+                        </a:xfrm>
+                        <a:prstGeom prst="rect">
+                          <a:avLst/>
+                        </a:prstGeom>
+                      </p:spPr>
+                    </p:pic>
+                  </p:oleObj>
+                </mc:Fallback>
+              </mc:AlternateContent>
+            </a:graphicData>
+          </a:graphic>
+        </p:graphicFrame>
+        <p:sp>
+          <p:nvSpPr>
+            <p:cNvPr id="44" name="TextBox 43"/>
+            <p:cNvSpPr txBox="1"/>
+            <p:nvPr/>
+          </p:nvSpPr>
+          <p:spPr>
+            <a:xfrm>
+              <a:off x="4046767" y="5811873"/>
+              <a:ext cx="1685465" cy="523220"/>
+            </a:xfrm>
+            <a:prstGeom prst="rect">
+              <a:avLst/>
+            </a:prstGeom>
+            <a:noFill/>
+          </p:spPr>
+          <p:txBody>
+            <a:bodyPr wrap="square" rtlCol="0">
+              <a:spAutoFit/>
+            </a:bodyPr>
+            <a:lstStyle/>
+            <a:p>
+              <a:pPr algn="ctr"/>
+              <a:r>
+                <a:rPr lang="en-US" sz="1400" dirty="0" smtClean="0">
+                  <a:latin typeface="Times"/>
+                  <a:cs typeface="Times"/>
+                </a:rPr>
+                <a:t>Sample x Dimension matrix</a:t>
+              </a:r>
+              <a:endParaRPr lang="en-US" sz="1400" dirty="0">
+                <a:latin typeface="Times"/>
+                <a:cs typeface="Times"/>
+              </a:endParaRPr>
+            </a:p>
+          </p:txBody>
+        </p:sp>
+        <p:grpSp>
+          <p:nvGrpSpPr>
+            <p:cNvPr id="45" name="Group 44"/>
+            <p:cNvGrpSpPr/>
+            <p:nvPr/>
+          </p:nvGrpSpPr>
+          <p:grpSpPr>
+            <a:xfrm>
+              <a:off x="4594957" y="3833258"/>
+              <a:ext cx="446943" cy="863599"/>
+              <a:chOff x="4490182" y="3696733"/>
+              <a:chExt cx="446943" cy="863599"/>
+            </a:xfrm>
+          </p:grpSpPr>
+          <p:cxnSp>
+            <p:nvCxnSpPr>
+              <p:cNvPr id="46" name="Straight Arrow Connector 45"/>
+              <p:cNvCxnSpPr/>
+              <p:nvPr/>
+            </p:nvCxnSpPr>
+            <p:spPr>
+              <a:xfrm>
+                <a:off x="4937125" y="3696733"/>
+                <a:ext cx="0" cy="863599"/>
+              </a:xfrm>
+              <a:prstGeom prst="straightConnector1">
+                <a:avLst/>
+              </a:prstGeom>
+              <a:ln>
+                <a:solidFill>
+                  <a:schemeClr val="bg1">
+                    <a:lumMod val="50000"/>
+                  </a:schemeClr>
+                </a:solidFill>
+                <a:tailEnd type="arrow"/>
+              </a:ln>
+            </p:spPr>
+            <p:style>
+              <a:lnRef idx="2">
+                <a:schemeClr val="accent1"/>
+              </a:lnRef>
+              <a:fillRef idx="0">
+                <a:schemeClr val="accent1"/>
+              </a:fillRef>
+              <a:effectRef idx="1">
+                <a:schemeClr val="accent1"/>
+              </a:effectRef>
+              <a:fontRef idx="minor">
+                <a:schemeClr val="tx1"/>
+              </a:fontRef>
+            </p:style>
+          </p:cxnSp>
+          <p:sp>
+            <p:nvSpPr>
+              <p:cNvPr id="47" name="TextBox 46"/>
+              <p:cNvSpPr txBox="1"/>
+              <p:nvPr/>
+            </p:nvSpPr>
+            <p:spPr>
+              <a:xfrm>
+                <a:off x="4490182" y="3821668"/>
+                <a:ext cx="349250" cy="369332"/>
+              </a:xfrm>
+              <a:prstGeom prst="rect">
+                <a:avLst/>
+              </a:prstGeom>
+              <a:noFill/>
+            </p:spPr>
+            <p:txBody>
+              <a:bodyPr wrap="square" rtlCol="0">
+                <a:spAutoFit/>
+              </a:bodyPr>
+              <a:lstStyle/>
+              <a:p>
+                <a:r>
+                  <a:rPr lang="en-US" b="1" dirty="0"/>
+                  <a:t>2</a:t>
+                </a:r>
+              </a:p>
+            </p:txBody>
+          </p:sp>
+        </p:grpSp>
+      </p:grpSp>
+      <p:sp>
+        <p:nvSpPr>
+          <p:cNvPr id="52" name="Rectangle 51"/>
+          <p:cNvSpPr/>
+          <p:nvPr/>
+        </p:nvSpPr>
+        <p:spPr>
+          <a:xfrm>
+            <a:off x="6619875" y="1291531"/>
+            <a:ext cx="1931380" cy="1660028"/>
+          </a:xfrm>
+          <a:prstGeom prst="rect">
+            <a:avLst/>
+          </a:prstGeom>
+          <a:noFill/>
+          <a:ln>
+            <a:solidFill>
+              <a:schemeClr val="tx1"/>
+            </a:solidFill>
+          </a:ln>
+        </p:spPr>
+        <p:style>
+          <a:lnRef idx="1">
+            <a:schemeClr val="accent1"/>
+          </a:lnRef>
+          <a:fillRef idx="3">
+            <a:schemeClr val="accent1"/>
+          </a:fillRef>
+          <a:effectRef idx="2">
+            <a:schemeClr val="accent1"/>
+          </a:effectRef>
+          <a:fontRef idx="minor">
+            <a:schemeClr val="lt1"/>
+          </a:fontRef>
+        </p:style>
+        <p:txBody>
+          <a:bodyPr rtlCol="0" anchor="ctr"/>
           <a:lstStyle/>
           <a:p>
+            <a:pPr algn="ctr"/>
             <a:endParaRPr lang="en-US"/>
+          </a:p>
+        </p:txBody>
+      </p:sp>
+      <p:sp>
+        <p:nvSpPr>
+          <p:cNvPr id="53" name="TextBox 52"/>
+          <p:cNvSpPr txBox="1"/>
+          <p:nvPr/>
+        </p:nvSpPr>
+        <p:spPr>
+          <a:xfrm>
+            <a:off x="6683376" y="2500450"/>
+            <a:ext cx="2003424" cy="338554"/>
+          </a:xfrm>
+          <a:prstGeom prst="rect">
+            <a:avLst/>
+          </a:prstGeom>
+          <a:noFill/>
+        </p:spPr>
+        <p:txBody>
+          <a:bodyPr wrap="square" rtlCol="0">
+            <a:spAutoFit/>
+          </a:bodyPr>
+          <a:lstStyle/>
+          <a:p>
+            <a:r>
+              <a:rPr lang="en-US" sz="1600" dirty="0" smtClean="0">
+                <a:latin typeface="Times"/>
+                <a:cs typeface="Times"/>
+              </a:rPr>
+              <a:t>H</a:t>
+            </a:r>
+            <a:r>
+              <a:rPr lang="en-US" sz="1600" baseline="-25000" dirty="0" smtClean="0">
+                <a:latin typeface="Times"/>
+                <a:cs typeface="Times"/>
+              </a:rPr>
+              <a:t>2</a:t>
+            </a:r>
+            <a:r>
+              <a:rPr lang="en-US" sz="1600" dirty="0" smtClean="0">
+                <a:latin typeface="Times"/>
+                <a:cs typeface="Times"/>
+              </a:rPr>
+              <a:t>O.ai auto-encoder</a:t>
+            </a:r>
+            <a:endParaRPr lang="en-US" sz="1600" dirty="0">
+              <a:latin typeface="Times"/>
+              <a:cs typeface="Times"/>
+            </a:endParaRPr>
+          </a:p>
+        </p:txBody>
+      </p:sp>
+      <p:grpSp>
+        <p:nvGrpSpPr>
+          <p:cNvPr id="54" name="Group 53"/>
+          <p:cNvGrpSpPr/>
+          <p:nvPr/>
+        </p:nvGrpSpPr>
+        <p:grpSpPr>
+          <a:xfrm>
+            <a:off x="7604125" y="3219450"/>
+            <a:ext cx="349250" cy="1289050"/>
+            <a:chOff x="4310917" y="1630163"/>
+            <a:chExt cx="349250" cy="1289050"/>
+          </a:xfrm>
+        </p:grpSpPr>
+        <p:cxnSp>
+          <p:nvCxnSpPr>
+            <p:cNvPr id="55" name="Straight Arrow Connector 54"/>
+            <p:cNvCxnSpPr/>
+            <p:nvPr/>
+          </p:nvCxnSpPr>
+          <p:spPr>
+            <a:xfrm>
+              <a:off x="4310917" y="1630163"/>
+              <a:ext cx="0" cy="1289050"/>
+            </a:xfrm>
+            <a:prstGeom prst="straightConnector1">
+              <a:avLst/>
+            </a:prstGeom>
+            <a:ln>
+              <a:solidFill>
+                <a:schemeClr val="bg1">
+                  <a:lumMod val="50000"/>
+                </a:schemeClr>
+              </a:solidFill>
+              <a:tailEnd type="arrow"/>
+            </a:ln>
+          </p:spPr>
+          <p:style>
+            <a:lnRef idx="2">
+              <a:schemeClr val="accent1"/>
+            </a:lnRef>
+            <a:fillRef idx="0">
+              <a:schemeClr val="accent1"/>
+            </a:fillRef>
+            <a:effectRef idx="1">
+              <a:schemeClr val="accent1"/>
+            </a:effectRef>
+            <a:fontRef idx="minor">
+              <a:schemeClr val="tx1"/>
+            </a:fontRef>
+          </p:style>
+        </p:cxnSp>
+        <p:sp>
+          <p:nvSpPr>
+            <p:cNvPr id="56" name="TextBox 55"/>
+            <p:cNvSpPr txBox="1"/>
+            <p:nvPr/>
+          </p:nvSpPr>
+          <p:spPr>
+            <a:xfrm>
+              <a:off x="4310917" y="2024379"/>
+              <a:ext cx="349250" cy="369332"/>
+            </a:xfrm>
+            <a:prstGeom prst="rect">
+              <a:avLst/>
+            </a:prstGeom>
+            <a:noFill/>
+          </p:spPr>
+          <p:txBody>
+            <a:bodyPr wrap="square" rtlCol="0">
+              <a:spAutoFit/>
+            </a:bodyPr>
+            <a:lstStyle/>
+            <a:p>
+              <a:r>
+                <a:rPr lang="en-US" b="1" dirty="0"/>
+                <a:t>4</a:t>
+              </a:r>
+            </a:p>
+          </p:txBody>
+        </p:sp>
+      </p:grpSp>
+      <p:sp>
+        <p:nvSpPr>
+          <p:cNvPr id="59" name="TextBox 58"/>
+          <p:cNvSpPr txBox="1"/>
+          <p:nvPr/>
+        </p:nvSpPr>
+        <p:spPr>
+          <a:xfrm>
+            <a:off x="6683376" y="4580766"/>
+            <a:ext cx="2069653" cy="1754327"/>
+          </a:xfrm>
+          <a:prstGeom prst="rect">
+            <a:avLst/>
+          </a:prstGeom>
+          <a:noFill/>
+        </p:spPr>
+        <p:txBody>
+          <a:bodyPr wrap="square" rtlCol="0">
+            <a:spAutoFit/>
+          </a:bodyPr>
+          <a:lstStyle/>
+          <a:p>
+            <a:pPr algn="ctr"/>
+            <a:r>
+              <a:rPr lang="en-US" dirty="0" smtClean="0">
+                <a:latin typeface="Times"/>
+                <a:cs typeface="Times"/>
+              </a:rPr>
+              <a:t>0.0021</a:t>
+            </a:r>
+          </a:p>
+          <a:p>
+            <a:pPr algn="ctr"/>
+            <a:r>
+              <a:rPr lang="en-US" dirty="0" smtClean="0">
+                <a:latin typeface="Times"/>
+                <a:cs typeface="Times"/>
+              </a:rPr>
+              <a:t>0.0170</a:t>
+            </a:r>
+          </a:p>
+          <a:p>
+            <a:pPr algn="ctr"/>
+            <a:r>
+              <a:rPr lang="en-US" dirty="0" smtClean="0">
+                <a:latin typeface="Times"/>
+                <a:cs typeface="Times"/>
+              </a:rPr>
+              <a:t>0.0019</a:t>
+            </a:r>
+          </a:p>
+          <a:p>
+            <a:pPr algn="ctr"/>
+            <a:r>
+              <a:rPr lang="en-US" dirty="0" smtClean="0">
+                <a:latin typeface="Times"/>
+                <a:cs typeface="Times"/>
+              </a:rPr>
+              <a:t>.</a:t>
+            </a:r>
+          </a:p>
+          <a:p>
+            <a:pPr algn="ctr"/>
+            <a:r>
+              <a:rPr lang="en-US" dirty="0" smtClean="0">
+                <a:latin typeface="Times"/>
+                <a:cs typeface="Times"/>
+              </a:rPr>
+              <a:t>.</a:t>
+            </a:r>
+          </a:p>
+          <a:p>
+            <a:pPr algn="ctr"/>
+            <a:r>
+              <a:rPr lang="en-US" sz="1600" dirty="0" smtClean="0">
+                <a:latin typeface="Times"/>
+                <a:cs typeface="Times"/>
+              </a:rPr>
+              <a:t>Confidence Scores</a:t>
+            </a:r>
+            <a:endParaRPr lang="en-US" sz="1600" dirty="0">
+              <a:latin typeface="Times"/>
+              <a:cs typeface="Times"/>
+            </a:endParaRPr>
           </a:p>
         </p:txBody>
       </p:sp>
@@ -6307,9 +7518,631 @@
   <p:timing>
     <p:tnLst>
       <p:par>
-        <p:cTn xmlns:p14="http://schemas.microsoft.com/office/powerpoint/2010/main" id="1" dur="indefinite" restart="never" nodeType="tmRoot"/>
+        <p:cTn xmlns:p14="http://schemas.microsoft.com/office/powerpoint/2010/main" id="1" dur="indefinite" restart="never" nodeType="tmRoot">
+          <p:childTnLst>
+            <p:seq concurrent="1" nextAc="seek">
+              <p:cTn id="2" dur="indefinite" nodeType="mainSeq">
+                <p:childTnLst>
+                  <p:par>
+                    <p:cTn id="3" fill="hold">
+                      <p:stCondLst>
+                        <p:cond delay="indefinite"/>
+                      </p:stCondLst>
+                      <p:childTnLst>
+                        <p:par>
+                          <p:cTn id="4" fill="hold">
+                            <p:stCondLst>
+                              <p:cond delay="0"/>
+                            </p:stCondLst>
+                            <p:childTnLst>
+                              <p:par>
+                                <p:cTn id="5" presetID="12" presetClass="entr" presetSubtype="4" fill="hold" nodeType="clickEffect">
+                                  <p:stCondLst>
+                                    <p:cond delay="0"/>
+                                  </p:stCondLst>
+                                  <p:childTnLst>
+                                    <p:set>
+                                      <p:cBhvr>
+                                        <p:cTn id="6" dur="1" fill="hold">
+                                          <p:stCondLst>
+                                            <p:cond delay="0"/>
+                                          </p:stCondLst>
+                                        </p:cTn>
+                                        <p:tgtEl>
+                                          <p:spTgt spid="42"/>
+                                        </p:tgtEl>
+                                        <p:attrNameLst>
+                                          <p:attrName>style.visibility</p:attrName>
+                                        </p:attrNameLst>
+                                      </p:cBhvr>
+                                      <p:to>
+                                        <p:strVal val="visible"/>
+                                      </p:to>
+                                    </p:set>
+                                    <p:anim calcmode="lin" valueType="num">
+                                      <p:cBhvr additive="base">
+                                        <p:cTn id="7" dur="500"/>
+                                        <p:tgtEl>
+                                          <p:spTgt spid="42"/>
+                                        </p:tgtEl>
+                                        <p:attrNameLst>
+                                          <p:attrName>ppt_y</p:attrName>
+                                        </p:attrNameLst>
+                                      </p:cBhvr>
+                                      <p:tavLst>
+                                        <p:tav tm="0">
+                                          <p:val>
+                                            <p:strVal val="#ppt_y+#ppt_h*1.125000"/>
+                                          </p:val>
+                                        </p:tav>
+                                        <p:tav tm="100000">
+                                          <p:val>
+                                            <p:strVal val="#ppt_y"/>
+                                          </p:val>
+                                        </p:tav>
+                                      </p:tavLst>
+                                    </p:anim>
+                                    <p:animEffect transition="in" filter="wipe(up)">
+                                      <p:cBhvr>
+                                        <p:cTn id="8" dur="500"/>
+                                        <p:tgtEl>
+                                          <p:spTgt spid="42"/>
+                                        </p:tgtEl>
+                                      </p:cBhvr>
+                                    </p:animEffect>
+                                  </p:childTnLst>
+                                </p:cTn>
+                              </p:par>
+                              <p:par>
+                                <p:cTn id="9" presetID="12" presetClass="entr" presetSubtype="4" fill="hold" nodeType="withEffect">
+                                  <p:stCondLst>
+                                    <p:cond delay="0"/>
+                                  </p:stCondLst>
+                                  <p:childTnLst>
+                                    <p:set>
+                                      <p:cBhvr>
+                                        <p:cTn id="10" dur="1" fill="hold">
+                                          <p:stCondLst>
+                                            <p:cond delay="0"/>
+                                          </p:stCondLst>
+                                        </p:cTn>
+                                        <p:tgtEl>
+                                          <p:spTgt spid="34"/>
+                                        </p:tgtEl>
+                                        <p:attrNameLst>
+                                          <p:attrName>style.visibility</p:attrName>
+                                        </p:attrNameLst>
+                                      </p:cBhvr>
+                                      <p:to>
+                                        <p:strVal val="visible"/>
+                                      </p:to>
+                                    </p:set>
+                                    <p:anim calcmode="lin" valueType="num">
+                                      <p:cBhvr additive="base">
+                                        <p:cTn id="11" dur="500"/>
+                                        <p:tgtEl>
+                                          <p:spTgt spid="34"/>
+                                        </p:tgtEl>
+                                        <p:attrNameLst>
+                                          <p:attrName>ppt_y</p:attrName>
+                                        </p:attrNameLst>
+                                      </p:cBhvr>
+                                      <p:tavLst>
+                                        <p:tav tm="0">
+                                          <p:val>
+                                            <p:strVal val="#ppt_y+#ppt_h*1.125000"/>
+                                          </p:val>
+                                        </p:tav>
+                                        <p:tav tm="100000">
+                                          <p:val>
+                                            <p:strVal val="#ppt_y"/>
+                                          </p:val>
+                                        </p:tav>
+                                      </p:tavLst>
+                                    </p:anim>
+                                    <p:animEffect transition="in" filter="wipe(up)">
+                                      <p:cBhvr>
+                                        <p:cTn id="12" dur="500"/>
+                                        <p:tgtEl>
+                                          <p:spTgt spid="34"/>
+                                        </p:tgtEl>
+                                      </p:cBhvr>
+                                    </p:animEffect>
+                                  </p:childTnLst>
+                                </p:cTn>
+                              </p:par>
+                            </p:childTnLst>
+                          </p:cTn>
+                        </p:par>
+                      </p:childTnLst>
+                    </p:cTn>
+                  </p:par>
+                  <p:par>
+                    <p:cTn id="13" fill="hold">
+                      <p:stCondLst>
+                        <p:cond delay="indefinite"/>
+                      </p:stCondLst>
+                      <p:childTnLst>
+                        <p:par>
+                          <p:cTn id="14" fill="hold">
+                            <p:stCondLst>
+                              <p:cond delay="0"/>
+                            </p:stCondLst>
+                            <p:childTnLst>
+                              <p:par>
+                                <p:cTn id="15" presetID="12" presetClass="entr" presetSubtype="4" fill="hold" nodeType="clickEffect">
+                                  <p:stCondLst>
+                                    <p:cond delay="0"/>
+                                  </p:stCondLst>
+                                  <p:childTnLst>
+                                    <p:set>
+                                      <p:cBhvr>
+                                        <p:cTn id="16" dur="1" fill="hold">
+                                          <p:stCondLst>
+                                            <p:cond delay="0"/>
+                                          </p:stCondLst>
+                                        </p:cTn>
+                                        <p:tgtEl>
+                                          <p:spTgt spid="60"/>
+                                        </p:tgtEl>
+                                        <p:attrNameLst>
+                                          <p:attrName>style.visibility</p:attrName>
+                                        </p:attrNameLst>
+                                      </p:cBhvr>
+                                      <p:to>
+                                        <p:strVal val="visible"/>
+                                      </p:to>
+                                    </p:set>
+                                    <p:anim calcmode="lin" valueType="num">
+                                      <p:cBhvr additive="base">
+                                        <p:cTn id="17" dur="500"/>
+                                        <p:tgtEl>
+                                          <p:spTgt spid="60"/>
+                                        </p:tgtEl>
+                                        <p:attrNameLst>
+                                          <p:attrName>ppt_y</p:attrName>
+                                        </p:attrNameLst>
+                                      </p:cBhvr>
+                                      <p:tavLst>
+                                        <p:tav tm="0">
+                                          <p:val>
+                                            <p:strVal val="#ppt_y+#ppt_h*1.125000"/>
+                                          </p:val>
+                                        </p:tav>
+                                        <p:tav tm="100000">
+                                          <p:val>
+                                            <p:strVal val="#ppt_y"/>
+                                          </p:val>
+                                        </p:tav>
+                                      </p:tavLst>
+                                    </p:anim>
+                                    <p:animEffect transition="in" filter="wipe(up)">
+                                      <p:cBhvr>
+                                        <p:cTn id="18" dur="500"/>
+                                        <p:tgtEl>
+                                          <p:spTgt spid="60"/>
+                                        </p:tgtEl>
+                                      </p:cBhvr>
+                                    </p:animEffect>
+                                  </p:childTnLst>
+                                </p:cTn>
+                              </p:par>
+                            </p:childTnLst>
+                          </p:cTn>
+                        </p:par>
+                      </p:childTnLst>
+                    </p:cTn>
+                  </p:par>
+                  <p:par>
+                    <p:cTn id="19" fill="hold">
+                      <p:stCondLst>
+                        <p:cond delay="indefinite"/>
+                      </p:stCondLst>
+                      <p:childTnLst>
+                        <p:par>
+                          <p:cTn id="20" fill="hold">
+                            <p:stCondLst>
+                              <p:cond delay="0"/>
+                            </p:stCondLst>
+                            <p:childTnLst>
+                              <p:par>
+                                <p:cTn id="21" presetID="12" presetClass="entr" presetSubtype="4" fill="hold" nodeType="clickEffect">
+                                  <p:stCondLst>
+                                    <p:cond delay="0"/>
+                                  </p:stCondLst>
+                                  <p:childTnLst>
+                                    <p:set>
+                                      <p:cBhvr>
+                                        <p:cTn id="22" dur="1" fill="hold">
+                                          <p:stCondLst>
+                                            <p:cond delay="0"/>
+                                          </p:stCondLst>
+                                        </p:cTn>
+                                        <p:tgtEl>
+                                          <p:spTgt spid="43"/>
+                                        </p:tgtEl>
+                                        <p:attrNameLst>
+                                          <p:attrName>style.visibility</p:attrName>
+                                        </p:attrNameLst>
+                                      </p:cBhvr>
+                                      <p:to>
+                                        <p:strVal val="visible"/>
+                                      </p:to>
+                                    </p:set>
+                                    <p:anim calcmode="lin" valueType="num">
+                                      <p:cBhvr additive="base">
+                                        <p:cTn id="23" dur="500"/>
+                                        <p:tgtEl>
+                                          <p:spTgt spid="43"/>
+                                        </p:tgtEl>
+                                        <p:attrNameLst>
+                                          <p:attrName>ppt_y</p:attrName>
+                                        </p:attrNameLst>
+                                      </p:cBhvr>
+                                      <p:tavLst>
+                                        <p:tav tm="0">
+                                          <p:val>
+                                            <p:strVal val="#ppt_y+#ppt_h*1.125000"/>
+                                          </p:val>
+                                        </p:tav>
+                                        <p:tav tm="100000">
+                                          <p:val>
+                                            <p:strVal val="#ppt_y"/>
+                                          </p:val>
+                                        </p:tav>
+                                      </p:tavLst>
+                                    </p:anim>
+                                    <p:animEffect transition="in" filter="wipe(up)">
+                                      <p:cBhvr>
+                                        <p:cTn id="24" dur="500"/>
+                                        <p:tgtEl>
+                                          <p:spTgt spid="43"/>
+                                        </p:tgtEl>
+                                      </p:cBhvr>
+                                    </p:animEffect>
+                                  </p:childTnLst>
+                                </p:cTn>
+                              </p:par>
+                              <p:par>
+                                <p:cTn id="25" presetID="12" presetClass="entr" presetSubtype="4" fill="hold" nodeType="withEffect">
+                                  <p:stCondLst>
+                                    <p:cond delay="0"/>
+                                  </p:stCondLst>
+                                  <p:childTnLst>
+                                    <p:set>
+                                      <p:cBhvr>
+                                        <p:cTn id="26" dur="1" fill="hold">
+                                          <p:stCondLst>
+                                            <p:cond delay="0"/>
+                                          </p:stCondLst>
+                                        </p:cTn>
+                                        <p:tgtEl>
+                                          <p:spTgt spid="4"/>
+                                        </p:tgtEl>
+                                        <p:attrNameLst>
+                                          <p:attrName>style.visibility</p:attrName>
+                                        </p:attrNameLst>
+                                      </p:cBhvr>
+                                      <p:to>
+                                        <p:strVal val="visible"/>
+                                      </p:to>
+                                    </p:set>
+                                    <p:anim calcmode="lin" valueType="num">
+                                      <p:cBhvr additive="base">
+                                        <p:cTn id="27" dur="500"/>
+                                        <p:tgtEl>
+                                          <p:spTgt spid="4"/>
+                                        </p:tgtEl>
+                                        <p:attrNameLst>
+                                          <p:attrName>ppt_y</p:attrName>
+                                        </p:attrNameLst>
+                                      </p:cBhvr>
+                                      <p:tavLst>
+                                        <p:tav tm="0">
+                                          <p:val>
+                                            <p:strVal val="#ppt_y+#ppt_h*1.125000"/>
+                                          </p:val>
+                                        </p:tav>
+                                        <p:tav tm="100000">
+                                          <p:val>
+                                            <p:strVal val="#ppt_y"/>
+                                          </p:val>
+                                        </p:tav>
+                                      </p:tavLst>
+                                    </p:anim>
+                                    <p:animEffect transition="in" filter="wipe(up)">
+                                      <p:cBhvr>
+                                        <p:cTn id="28" dur="500"/>
+                                        <p:tgtEl>
+                                          <p:spTgt spid="4"/>
+                                        </p:tgtEl>
+                                      </p:cBhvr>
+                                    </p:animEffect>
+                                  </p:childTnLst>
+                                </p:cTn>
+                              </p:par>
+                              <p:par>
+                                <p:cTn id="29" presetID="12" presetClass="entr" presetSubtype="4" fill="hold" grpId="0" nodeType="withEffect">
+                                  <p:stCondLst>
+                                    <p:cond delay="0"/>
+                                  </p:stCondLst>
+                                  <p:childTnLst>
+                                    <p:set>
+                                      <p:cBhvr>
+                                        <p:cTn id="30" dur="1" fill="hold">
+                                          <p:stCondLst>
+                                            <p:cond delay="0"/>
+                                          </p:stCondLst>
+                                        </p:cTn>
+                                        <p:tgtEl>
+                                          <p:spTgt spid="52"/>
+                                        </p:tgtEl>
+                                        <p:attrNameLst>
+                                          <p:attrName>style.visibility</p:attrName>
+                                        </p:attrNameLst>
+                                      </p:cBhvr>
+                                      <p:to>
+                                        <p:strVal val="visible"/>
+                                      </p:to>
+                                    </p:set>
+                                    <p:anim calcmode="lin" valueType="num">
+                                      <p:cBhvr additive="base">
+                                        <p:cTn id="31" dur="500"/>
+                                        <p:tgtEl>
+                                          <p:spTgt spid="52"/>
+                                        </p:tgtEl>
+                                        <p:attrNameLst>
+                                          <p:attrName>ppt_y</p:attrName>
+                                        </p:attrNameLst>
+                                      </p:cBhvr>
+                                      <p:tavLst>
+                                        <p:tav tm="0">
+                                          <p:val>
+                                            <p:strVal val="#ppt_y+#ppt_h*1.125000"/>
+                                          </p:val>
+                                        </p:tav>
+                                        <p:tav tm="100000">
+                                          <p:val>
+                                            <p:strVal val="#ppt_y"/>
+                                          </p:val>
+                                        </p:tav>
+                                      </p:tavLst>
+                                    </p:anim>
+                                    <p:animEffect transition="in" filter="wipe(up)">
+                                      <p:cBhvr>
+                                        <p:cTn id="32" dur="500"/>
+                                        <p:tgtEl>
+                                          <p:spTgt spid="52"/>
+                                        </p:tgtEl>
+                                      </p:cBhvr>
+                                    </p:animEffect>
+                                  </p:childTnLst>
+                                </p:cTn>
+                              </p:par>
+                              <p:par>
+                                <p:cTn id="33" presetID="12" presetClass="entr" presetSubtype="4" fill="hold" grpId="0" nodeType="withEffect">
+                                  <p:stCondLst>
+                                    <p:cond delay="0"/>
+                                  </p:stCondLst>
+                                  <p:childTnLst>
+                                    <p:set>
+                                      <p:cBhvr>
+                                        <p:cTn id="34" dur="1" fill="hold">
+                                          <p:stCondLst>
+                                            <p:cond delay="0"/>
+                                          </p:stCondLst>
+                                        </p:cTn>
+                                        <p:tgtEl>
+                                          <p:spTgt spid="53"/>
+                                        </p:tgtEl>
+                                        <p:attrNameLst>
+                                          <p:attrName>style.visibility</p:attrName>
+                                        </p:attrNameLst>
+                                      </p:cBhvr>
+                                      <p:to>
+                                        <p:strVal val="visible"/>
+                                      </p:to>
+                                    </p:set>
+                                    <p:anim calcmode="lin" valueType="num">
+                                      <p:cBhvr additive="base">
+                                        <p:cTn id="35" dur="500"/>
+                                        <p:tgtEl>
+                                          <p:spTgt spid="53"/>
+                                        </p:tgtEl>
+                                        <p:attrNameLst>
+                                          <p:attrName>ppt_y</p:attrName>
+                                        </p:attrNameLst>
+                                      </p:cBhvr>
+                                      <p:tavLst>
+                                        <p:tav tm="0">
+                                          <p:val>
+                                            <p:strVal val="#ppt_y+#ppt_h*1.125000"/>
+                                          </p:val>
+                                        </p:tav>
+                                        <p:tav tm="100000">
+                                          <p:val>
+                                            <p:strVal val="#ppt_y"/>
+                                          </p:val>
+                                        </p:tav>
+                                      </p:tavLst>
+                                    </p:anim>
+                                    <p:animEffect transition="in" filter="wipe(up)">
+                                      <p:cBhvr>
+                                        <p:cTn id="36" dur="500"/>
+                                        <p:tgtEl>
+                                          <p:spTgt spid="53"/>
+                                        </p:tgtEl>
+                                      </p:cBhvr>
+                                    </p:animEffect>
+                                  </p:childTnLst>
+                                </p:cTn>
+                              </p:par>
+                            </p:childTnLst>
+                          </p:cTn>
+                        </p:par>
+                      </p:childTnLst>
+                    </p:cTn>
+                  </p:par>
+                  <p:par>
+                    <p:cTn id="37" fill="hold">
+                      <p:stCondLst>
+                        <p:cond delay="indefinite"/>
+                      </p:stCondLst>
+                      <p:childTnLst>
+                        <p:par>
+                          <p:cTn id="38" fill="hold">
+                            <p:stCondLst>
+                              <p:cond delay="0"/>
+                            </p:stCondLst>
+                            <p:childTnLst>
+                              <p:par>
+                                <p:cTn id="39" presetID="12" presetClass="entr" presetSubtype="4" fill="hold" nodeType="clickEffect">
+                                  <p:stCondLst>
+                                    <p:cond delay="0"/>
+                                  </p:stCondLst>
+                                  <p:childTnLst>
+                                    <p:set>
+                                      <p:cBhvr>
+                                        <p:cTn id="40" dur="1" fill="hold">
+                                          <p:stCondLst>
+                                            <p:cond delay="0"/>
+                                          </p:stCondLst>
+                                        </p:cTn>
+                                        <p:tgtEl>
+                                          <p:spTgt spid="54"/>
+                                        </p:tgtEl>
+                                        <p:attrNameLst>
+                                          <p:attrName>style.visibility</p:attrName>
+                                        </p:attrNameLst>
+                                      </p:cBhvr>
+                                      <p:to>
+                                        <p:strVal val="visible"/>
+                                      </p:to>
+                                    </p:set>
+                                    <p:anim calcmode="lin" valueType="num">
+                                      <p:cBhvr additive="base">
+                                        <p:cTn id="41" dur="500"/>
+                                        <p:tgtEl>
+                                          <p:spTgt spid="54"/>
+                                        </p:tgtEl>
+                                        <p:attrNameLst>
+                                          <p:attrName>ppt_y</p:attrName>
+                                        </p:attrNameLst>
+                                      </p:cBhvr>
+                                      <p:tavLst>
+                                        <p:tav tm="0">
+                                          <p:val>
+                                            <p:strVal val="#ppt_y+#ppt_h*1.125000"/>
+                                          </p:val>
+                                        </p:tav>
+                                        <p:tav tm="100000">
+                                          <p:val>
+                                            <p:strVal val="#ppt_y"/>
+                                          </p:val>
+                                        </p:tav>
+                                      </p:tavLst>
+                                    </p:anim>
+                                    <p:animEffect transition="in" filter="wipe(up)">
+                                      <p:cBhvr>
+                                        <p:cTn id="42" dur="500"/>
+                                        <p:tgtEl>
+                                          <p:spTgt spid="54"/>
+                                        </p:tgtEl>
+                                      </p:cBhvr>
+                                    </p:animEffect>
+                                  </p:childTnLst>
+                                </p:cTn>
+                              </p:par>
+                              <p:par>
+                                <p:cTn id="43" presetID="12" presetClass="entr" presetSubtype="4" fill="hold" grpId="0" nodeType="withEffect">
+                                  <p:stCondLst>
+                                    <p:cond delay="0"/>
+                                  </p:stCondLst>
+                                  <p:childTnLst>
+                                    <p:set>
+                                      <p:cBhvr>
+                                        <p:cTn id="44" dur="1" fill="hold">
+                                          <p:stCondLst>
+                                            <p:cond delay="0"/>
+                                          </p:stCondLst>
+                                        </p:cTn>
+                                        <p:tgtEl>
+                                          <p:spTgt spid="59"/>
+                                        </p:tgtEl>
+                                        <p:attrNameLst>
+                                          <p:attrName>style.visibility</p:attrName>
+                                        </p:attrNameLst>
+                                      </p:cBhvr>
+                                      <p:to>
+                                        <p:strVal val="visible"/>
+                                      </p:to>
+                                    </p:set>
+                                    <p:anim calcmode="lin" valueType="num">
+                                      <p:cBhvr additive="base">
+                                        <p:cTn id="45" dur="500"/>
+                                        <p:tgtEl>
+                                          <p:spTgt spid="59"/>
+                                        </p:tgtEl>
+                                        <p:attrNameLst>
+                                          <p:attrName>ppt_y</p:attrName>
+                                        </p:attrNameLst>
+                                      </p:cBhvr>
+                                      <p:tavLst>
+                                        <p:tav tm="0">
+                                          <p:val>
+                                            <p:strVal val="#ppt_y+#ppt_h*1.125000"/>
+                                          </p:val>
+                                        </p:tav>
+                                        <p:tav tm="100000">
+                                          <p:val>
+                                            <p:strVal val="#ppt_y"/>
+                                          </p:val>
+                                        </p:tav>
+                                      </p:tavLst>
+                                    </p:anim>
+                                    <p:animEffect transition="in" filter="wipe(up)">
+                                      <p:cBhvr>
+                                        <p:cTn id="46" dur="500"/>
+                                        <p:tgtEl>
+                                          <p:spTgt spid="59"/>
+                                        </p:tgtEl>
+                                      </p:cBhvr>
+                                    </p:animEffect>
+                                  </p:childTnLst>
+                                </p:cTn>
+                              </p:par>
+                            </p:childTnLst>
+                          </p:cTn>
+                        </p:par>
+                      </p:childTnLst>
+                    </p:cTn>
+                  </p:par>
+                </p:childTnLst>
+              </p:cTn>
+              <p:prevCondLst>
+                <p:cond evt="onPrev" delay="0">
+                  <p:tgtEl>
+                    <p:sldTgt/>
+                  </p:tgtEl>
+                </p:cond>
+              </p:prevCondLst>
+              <p:nextCondLst>
+                <p:cond evt="onNext" delay="0">
+                  <p:tgtEl>
+                    <p:sldTgt/>
+                  </p:tgtEl>
+                </p:cond>
+              </p:nextCondLst>
+            </p:seq>
+          </p:childTnLst>
+        </p:cTn>
       </p:par>
     </p:tnLst>
+    <p:bldLst>
+      <p:bldP spid="52" grpId="0" animBg="1"/>
+      <p:bldP spid="53" grpId="0"/>
+      <p:bldP spid="59" grpId="0"/>
+    </p:bldLst>
   </p:timing>
 </p:sld>
 </file>

</xml_diff>

<commit_message>
Finish presentation try #2
</commit_message>
<xml_diff>
--- a/report/02-presentation/presentation.pptx
+++ b/report/02-presentation/presentation.pptx
@@ -209,7 +209,7 @@
           <a:p>
             <a:fld id="{0E583D0F-5092-0143-B30E-21CA42EDA099}" type="datetimeFigureOut">
               <a:rPr lang="en-US" smtClean="0"/>
-              <a:t>7/13/15</a:t>
+              <a:t>7/14/15</a:t>
             </a:fld>
             <a:endParaRPr lang="en-US"/>
           </a:p>
@@ -971,7 +971,7 @@
           <a:p>
             <a:fld id="{543DBFE0-A62E-9C4A-800D-59BFF5B4310D}" type="datetimeFigureOut">
               <a:rPr lang="en-US" smtClean="0"/>
-              <a:t>7/13/15</a:t>
+              <a:t>7/14/15</a:t>
             </a:fld>
             <a:endParaRPr lang="en-US"/>
           </a:p>
@@ -1141,7 +1141,7 @@
           <a:p>
             <a:fld id="{543DBFE0-A62E-9C4A-800D-59BFF5B4310D}" type="datetimeFigureOut">
               <a:rPr lang="en-US" smtClean="0"/>
-              <a:t>7/13/15</a:t>
+              <a:t>7/14/15</a:t>
             </a:fld>
             <a:endParaRPr lang="en-US"/>
           </a:p>
@@ -1321,7 +1321,7 @@
           <a:p>
             <a:fld id="{543DBFE0-A62E-9C4A-800D-59BFF5B4310D}" type="datetimeFigureOut">
               <a:rPr lang="en-US" smtClean="0"/>
-              <a:t>7/13/15</a:t>
+              <a:t>7/14/15</a:t>
             </a:fld>
             <a:endParaRPr lang="en-US"/>
           </a:p>
@@ -1491,7 +1491,7 @@
           <a:p>
             <a:fld id="{543DBFE0-A62E-9C4A-800D-59BFF5B4310D}" type="datetimeFigureOut">
               <a:rPr lang="en-US" smtClean="0"/>
-              <a:t>7/13/15</a:t>
+              <a:t>7/14/15</a:t>
             </a:fld>
             <a:endParaRPr lang="en-US"/>
           </a:p>
@@ -1737,7 +1737,7 @@
           <a:p>
             <a:fld id="{543DBFE0-A62E-9C4A-800D-59BFF5B4310D}" type="datetimeFigureOut">
               <a:rPr lang="en-US" smtClean="0"/>
-              <a:t>7/13/15</a:t>
+              <a:t>7/14/15</a:t>
             </a:fld>
             <a:endParaRPr lang="en-US"/>
           </a:p>
@@ -2025,7 +2025,7 @@
           <a:p>
             <a:fld id="{543DBFE0-A62E-9C4A-800D-59BFF5B4310D}" type="datetimeFigureOut">
               <a:rPr lang="en-US" smtClean="0"/>
-              <a:t>7/13/15</a:t>
+              <a:t>7/14/15</a:t>
             </a:fld>
             <a:endParaRPr lang="en-US"/>
           </a:p>
@@ -2447,7 +2447,7 @@
           <a:p>
             <a:fld id="{543DBFE0-A62E-9C4A-800D-59BFF5B4310D}" type="datetimeFigureOut">
               <a:rPr lang="en-US" smtClean="0"/>
-              <a:t>7/13/15</a:t>
+              <a:t>7/14/15</a:t>
             </a:fld>
             <a:endParaRPr lang="en-US"/>
           </a:p>
@@ -2565,7 +2565,7 @@
           <a:p>
             <a:fld id="{543DBFE0-A62E-9C4A-800D-59BFF5B4310D}" type="datetimeFigureOut">
               <a:rPr lang="en-US" smtClean="0"/>
-              <a:t>7/13/15</a:t>
+              <a:t>7/14/15</a:t>
             </a:fld>
             <a:endParaRPr lang="en-US"/>
           </a:p>
@@ -2660,7 +2660,7 @@
           <a:p>
             <a:fld id="{543DBFE0-A62E-9C4A-800D-59BFF5B4310D}" type="datetimeFigureOut">
               <a:rPr lang="en-US" smtClean="0"/>
-              <a:t>7/13/15</a:t>
+              <a:t>7/14/15</a:t>
             </a:fld>
             <a:endParaRPr lang="en-US"/>
           </a:p>
@@ -2937,7 +2937,7 @@
           <a:p>
             <a:fld id="{543DBFE0-A62E-9C4A-800D-59BFF5B4310D}" type="datetimeFigureOut">
               <a:rPr lang="en-US" smtClean="0"/>
-              <a:t>7/13/15</a:t>
+              <a:t>7/14/15</a:t>
             </a:fld>
             <a:endParaRPr lang="en-US"/>
           </a:p>
@@ -3191,7 +3191,7 @@
           <a:p>
             <a:fld id="{543DBFE0-A62E-9C4A-800D-59BFF5B4310D}" type="datetimeFigureOut">
               <a:rPr lang="en-US" smtClean="0"/>
-              <a:t>7/13/15</a:t>
+              <a:t>7/14/15</a:t>
             </a:fld>
             <a:endParaRPr lang="en-US"/>
           </a:p>
@@ -3404,7 +3404,7 @@
           <a:p>
             <a:fld id="{543DBFE0-A62E-9C4A-800D-59BFF5B4310D}" type="datetimeFigureOut">
               <a:rPr lang="en-US" smtClean="0"/>
-              <a:t>7/13/15</a:t>
+              <a:t>7/14/15</a:t>
             </a:fld>
             <a:endParaRPr lang="en-US"/>
           </a:p>
@@ -4300,7 +4300,7 @@
             <a:graphicData uri="http://schemas.openxmlformats.org/presentationml/2006/ole">
               <mc:AlternateContent xmlns:mc="http://schemas.openxmlformats.org/markup-compatibility/2006">
                 <mc:Choice xmlns:v="urn:schemas-microsoft-com:vml" Requires="v">
-                  <p:oleObj spid="_x0000_s7175" name="Equation" r:id="rId4" imgW="1981200" imgH="1397000" progId="Equation.3">
+                  <p:oleObj spid="_x0000_s7178" name="Equation" r:id="rId4" imgW="1981200" imgH="1397000" progId="Equation.3">
                     <p:embed/>
                   </p:oleObj>
                 </mc:Choice>
@@ -5758,7 +5758,7 @@
             <a:graphicData uri="http://schemas.openxmlformats.org/presentationml/2006/ole">
               <mc:AlternateContent xmlns:mc="http://schemas.openxmlformats.org/markup-compatibility/2006">
                 <mc:Choice xmlns:v="urn:schemas-microsoft-com:vml" Requires="v">
-                  <p:oleObj spid="_x0000_s8197" name="Equation" r:id="rId6" imgW="1981200" imgH="1397000" progId="Equation.3">
+                  <p:oleObj spid="_x0000_s8200" name="Equation" r:id="rId6" imgW="1981200" imgH="1397000" progId="Equation.3">
                     <p:embed/>
                   </p:oleObj>
                 </mc:Choice>
@@ -6819,7 +6819,7 @@
       </p:sp>
       <p:pic>
         <p:nvPicPr>
-          <p:cNvPr id="5" name="Picture 4" descr="kaggle-result-2.png"/>
+          <p:cNvPr id="4" name="Picture 3" descr="kaggle-result-3.png"/>
           <p:cNvPicPr>
             <a:picLocks noChangeAspect="1"/>
           </p:cNvPicPr>
@@ -6833,43 +6833,13 @@
               </a:ext>
             </a:extLst>
           </a:blip>
-          <a:srcRect t="15157" b="17629"/>
+          <a:srcRect b="26397"/>
           <a:stretch/>
         </p:blipFill>
         <p:spPr>
           <a:xfrm>
-            <a:off x="15875" y="1587500"/>
-            <a:ext cx="9144000" cy="1936750"/>
-          </a:xfrm>
-          <a:prstGeom prst="rect">
-            <a:avLst/>
-          </a:prstGeom>
-        </p:spPr>
-      </p:pic>
-      <p:pic>
-        <p:nvPicPr>
-          <p:cNvPr id="4" name="Picture 3" descr="kaggle-result-3.png"/>
-          <p:cNvPicPr>
-            <a:picLocks noChangeAspect="1"/>
-          </p:cNvPicPr>
-          <p:nvPr/>
-        </p:nvPicPr>
-        <p:blipFill>
-          <a:blip r:embed="rId3">
-            <a:extLst>
-              <a:ext uri="{28A0092B-C50C-407E-A947-70E740481C1C}">
-                <a14:useLocalDpi xmlns:a14="http://schemas.microsoft.com/office/drawing/2010/main" val="0"/>
-              </a:ext>
-            </a:extLst>
-          </a:blip>
-          <a:stretch>
-            <a:fillRect/>
-          </a:stretch>
-        </p:blipFill>
-        <p:spPr>
-          <a:xfrm>
-            <a:off x="0" y="1566674"/>
-            <a:ext cx="9144000" cy="2803903"/>
+            <a:off x="0" y="1587500"/>
+            <a:ext cx="9144000" cy="2063751"/>
           </a:xfrm>
           <a:prstGeom prst="rect">
             <a:avLst/>
@@ -7904,7 +7874,6 @@
               <a:rPr lang="en-US" dirty="0" smtClean="0"/>
               <a:t>Problem Statement</a:t>
             </a:r>
-            <a:endParaRPr lang="en-US" dirty="0" smtClean="0"/>
           </a:p>
           <a:p>
             <a:pPr marL="514350" indent="-514350">
@@ -8420,14 +8389,7 @@
                 <a:latin typeface="Times"/>
                 <a:cs typeface="Times"/>
               </a:rPr>
-              <a:t> </a:t>
-            </a:r>
-            <a:r>
-              <a:rPr lang="en-US" sz="1100" dirty="0" smtClean="0">
-                <a:latin typeface="Times"/>
-                <a:cs typeface="Times"/>
-              </a:rPr>
-              <a:t>Practical Machine Learning: A new Look at Anomaly Detection</a:t>
+              <a:t> Practical Machine Learning: A new Look at Anomaly Detection</a:t>
             </a:r>
             <a:endParaRPr lang="en-US" sz="2000" dirty="0" smtClean="0">
               <a:latin typeface="Times"/>
@@ -9485,7 +9447,7 @@
           <a:graphicData uri="http://schemas.openxmlformats.org/presentationml/2006/ole">
             <mc:AlternateContent xmlns:mc="http://schemas.openxmlformats.org/markup-compatibility/2006">
               <mc:Choice xmlns:v="urn:schemas-microsoft-com:vml" Requires="v">
-                <p:oleObj spid="_x0000_s2095" name="Equation" r:id="rId4" imgW="1625600" imgH="1130300" progId="Equation.3">
+                <p:oleObj spid="_x0000_s2102" name="Equation" r:id="rId4" imgW="1625600" imgH="1130300" progId="Equation.3">
                   <p:embed/>
                 </p:oleObj>
               </mc:Choice>
@@ -9614,7 +9576,7 @@
           <a:graphicData uri="http://schemas.openxmlformats.org/presentationml/2006/ole">
             <mc:AlternateContent xmlns:mc="http://schemas.openxmlformats.org/markup-compatibility/2006">
               <mc:Choice xmlns:v="urn:schemas-microsoft-com:vml" Requires="v">
-                <p:oleObj spid="_x0000_s2096" name="Equation" r:id="rId6" imgW="2336800" imgH="1130300" progId="Equation.3">
+                <p:oleObj spid="_x0000_s2103" name="Equation" r:id="rId6" imgW="2336800" imgH="1130300" progId="Equation.3">
                   <p:embed/>
                 </p:oleObj>
               </mc:Choice>
@@ -9783,7 +9745,7 @@
           <a:graphicData uri="http://schemas.openxmlformats.org/presentationml/2006/ole">
             <mc:AlternateContent xmlns:mc="http://schemas.openxmlformats.org/markup-compatibility/2006">
               <mc:Choice xmlns:v="urn:schemas-microsoft-com:vml" Requires="v">
-                <p:oleObj spid="_x0000_s2097" name="Equation" r:id="rId8" imgW="266700" imgH="203200" progId="Equation.3">
+                <p:oleObj spid="_x0000_s2104" name="Equation" r:id="rId8" imgW="266700" imgH="203200" progId="Equation.3">
                   <p:embed/>
                 </p:oleObj>
               </mc:Choice>
@@ -10877,7 +10839,7 @@
             <a:graphicData uri="http://schemas.openxmlformats.org/presentationml/2006/ole">
               <mc:AlternateContent xmlns:mc="http://schemas.openxmlformats.org/markup-compatibility/2006">
                 <mc:Choice xmlns:v="urn:schemas-microsoft-com:vml" Requires="v">
-                  <p:oleObj spid="_x0000_s3083" name="Equation" r:id="rId7" imgW="1981200" imgH="1397000" progId="Equation.3">
+                  <p:oleObj spid="_x0000_s3086" name="Equation" r:id="rId7" imgW="1981200" imgH="1397000" progId="Equation.3">
                     <p:embed/>
                   </p:oleObj>
                 </mc:Choice>
@@ -12089,7 +12051,7 @@
             <a:graphicData uri="http://schemas.openxmlformats.org/presentationml/2006/ole">
               <mc:AlternateContent xmlns:mc="http://schemas.openxmlformats.org/markup-compatibility/2006">
                 <mc:Choice xmlns:v="urn:schemas-microsoft-com:vml" Requires="v">
-                  <p:oleObj spid="_x0000_s5129" name="Equation" r:id="rId4" imgW="1981200" imgH="1397000" progId="Equation.3">
+                  <p:oleObj spid="_x0000_s5132" name="Equation" r:id="rId4" imgW="1981200" imgH="1397000" progId="Equation.3">
                     <p:embed/>
                   </p:oleObj>
                 </mc:Choice>

</xml_diff>